<commit_message>
reset button, found bug on 0x0
</commit_message>
<xml_diff>
--- a/assets/icons.pptx
+++ b/assets/icons.pptx
@@ -10,6 +10,7 @@
     <p:sldId id="258" r:id="rId4"/>
     <p:sldId id="259" r:id="rId5"/>
     <p:sldId id="260" r:id="rId6"/>
+    <p:sldId id="261" r:id="rId7"/>
   </p:sldIdLst>
   <p:sldSz cx="12192000" cy="6858000"/>
   <p:notesSz cx="6858000" cy="9144000"/>
@@ -8325,6 +8326,94 @@
 </p:sld>
 </file>
 
+<file path=ppt/slides/slide6.xml><?xml version="1.0" encoding="utf-8"?>
+<p:sld xmlns:a="http://schemas.openxmlformats.org/drawingml/2006/main" xmlns:r="http://schemas.openxmlformats.org/officeDocument/2006/relationships" xmlns:p="http://schemas.openxmlformats.org/presentationml/2006/main">
+  <p:cSld>
+    <p:spTree>
+      <p:nvGrpSpPr>
+        <p:cNvPr id="1" name=""/>
+        <p:cNvGrpSpPr/>
+        <p:nvPr/>
+      </p:nvGrpSpPr>
+      <p:grpSpPr>
+        <a:xfrm>
+          <a:off x="0" y="0"/>
+          <a:ext cx="0" cy="0"/>
+          <a:chOff x="0" y="0"/>
+          <a:chExt cx="0" cy="0"/>
+        </a:xfrm>
+      </p:grpSpPr>
+      <p:sp>
+        <p:nvSpPr>
+          <p:cNvPr id="4" name="Rectangle: Rounded Corners 3">
+            <a:extLst>
+              <a:ext uri="{FF2B5EF4-FFF2-40B4-BE49-F238E27FC236}">
+                <a16:creationId xmlns:a16="http://schemas.microsoft.com/office/drawing/2014/main" id="{353B5F62-DC49-4188-AA2C-0861E457B012}"/>
+              </a:ext>
+            </a:extLst>
+          </p:cNvPr>
+          <p:cNvSpPr/>
+          <p:nvPr/>
+        </p:nvSpPr>
+        <p:spPr>
+          <a:xfrm>
+            <a:off x="773722" y="993532"/>
+            <a:ext cx="5776547" cy="2365130"/>
+          </a:xfrm>
+          <a:prstGeom prst="roundRect">
+            <a:avLst/>
+          </a:prstGeom>
+          <a:solidFill>
+            <a:schemeClr val="bg2">
+              <a:lumMod val="90000"/>
+            </a:schemeClr>
+          </a:solidFill>
+        </p:spPr>
+        <p:style>
+          <a:lnRef idx="2">
+            <a:schemeClr val="accent3">
+              <a:shade val="50000"/>
+            </a:schemeClr>
+          </a:lnRef>
+          <a:fillRef idx="1">
+            <a:schemeClr val="accent3"/>
+          </a:fillRef>
+          <a:effectRef idx="0">
+            <a:schemeClr val="accent3"/>
+          </a:effectRef>
+          <a:fontRef idx="minor">
+            <a:schemeClr val="lt1"/>
+          </a:fontRef>
+        </p:style>
+        <p:txBody>
+          <a:bodyPr rtlCol="0" anchor="ctr"/>
+          <a:lstStyle/>
+          <a:p>
+            <a:pPr algn="ctr"/>
+            <a:r>
+              <a:rPr lang="en-US" sz="13800" dirty="0">
+                <a:solidFill>
+                  <a:schemeClr val="tx1"/>
+                </a:solidFill>
+              </a:rPr>
+              <a:t>Reset</a:t>
+            </a:r>
+          </a:p>
+        </p:txBody>
+      </p:sp>
+    </p:spTree>
+    <p:extLst>
+      <p:ext uri="{BB962C8B-B14F-4D97-AF65-F5344CB8AC3E}">
+        <p14:creationId xmlns:p14="http://schemas.microsoft.com/office/powerpoint/2010/main" val="1332309607"/>
+      </p:ext>
+    </p:extLst>
+  </p:cSld>
+  <p:clrMapOvr>
+    <a:masterClrMapping/>
+  </p:clrMapOvr>
+</p:sld>
+</file>
+
 <file path=ppt/theme/theme1.xml><?xml version="1.0" encoding="utf-8"?>
 <a:theme xmlns:a="http://schemas.openxmlformats.org/drawingml/2006/main" name="Office Theme">
   <a:themeElements>

</xml_diff>